<commit_message>
update presentation and add concept sketches
</commit_message>
<xml_diff>
--- a/Presentation/Gruppe10(Präsentation1).pptx
+++ b/Presentation/Gruppe10(Präsentation1).pptx
@@ -5,7 +5,7 @@
     <p:sldMasterId id="2147483870" r:id="rId1"/>
   </p:sldMasterIdLst>
   <p:notesMasterIdLst>
-    <p:notesMasterId r:id="rId11"/>
+    <p:notesMasterId r:id="rId12"/>
   </p:notesMasterIdLst>
   <p:sldIdLst>
     <p:sldId id="256" r:id="rId2"/>
@@ -17,6 +17,7 @@
     <p:sldId id="259" r:id="rId8"/>
     <p:sldId id="258" r:id="rId9"/>
     <p:sldId id="261" r:id="rId10"/>
+    <p:sldId id="267" r:id="rId11"/>
   </p:sldIdLst>
   <p:sldSz cx="12192000" cy="6858000"/>
   <p:notesSz cx="6858000" cy="9144000"/>
@@ -364,7 +365,7 @@
           <a:p>
             <a:fld id="{B317077F-0BF6-4AB1-A0A2-447321C31DAC}" type="slidenum">
               <a:rPr lang="de-CH" smtClean="0"/>
-              <a:t>‹Nr.›</a:t>
+              <a:t>‹#›</a:t>
             </a:fld>
             <a:endParaRPr lang="de-CH"/>
           </a:p>
@@ -760,7 +761,7 @@
           <a:p>
             <a:fld id="{BD6BDAE4-A718-497F-BD43-B43AF474C268}" type="slidenum">
               <a:rPr lang="de-CH" smtClean="0"/>
-              <a:t>‹Nr.›</a:t>
+              <a:t>‹#›</a:t>
             </a:fld>
             <a:endParaRPr lang="de-CH"/>
           </a:p>
@@ -960,7 +961,7 @@
           <a:p>
             <a:fld id="{BD6BDAE4-A718-497F-BD43-B43AF474C268}" type="slidenum">
               <a:rPr lang="de-CH" smtClean="0"/>
-              <a:t>‹Nr.›</a:t>
+              <a:t>‹#›</a:t>
             </a:fld>
             <a:endParaRPr lang="de-CH"/>
           </a:p>
@@ -1170,7 +1171,7 @@
           <a:p>
             <a:fld id="{BD6BDAE4-A718-497F-BD43-B43AF474C268}" type="slidenum">
               <a:rPr lang="de-CH" smtClean="0"/>
-              <a:t>‹Nr.›</a:t>
+              <a:t>‹#›</a:t>
             </a:fld>
             <a:endParaRPr lang="de-CH"/>
           </a:p>
@@ -1370,7 +1371,7 @@
           <a:p>
             <a:fld id="{BD6BDAE4-A718-497F-BD43-B43AF474C268}" type="slidenum">
               <a:rPr lang="de-CH" smtClean="0"/>
-              <a:t>‹Nr.›</a:t>
+              <a:t>‹#›</a:t>
             </a:fld>
             <a:endParaRPr lang="de-CH"/>
           </a:p>
@@ -1646,7 +1647,7 @@
           <a:p>
             <a:fld id="{BD6BDAE4-A718-497F-BD43-B43AF474C268}" type="slidenum">
               <a:rPr lang="de-CH" smtClean="0"/>
-              <a:t>‹Nr.›</a:t>
+              <a:t>‹#›</a:t>
             </a:fld>
             <a:endParaRPr lang="de-CH"/>
           </a:p>
@@ -1914,7 +1915,7 @@
           <a:p>
             <a:fld id="{BD6BDAE4-A718-497F-BD43-B43AF474C268}" type="slidenum">
               <a:rPr lang="de-CH" smtClean="0"/>
-              <a:t>‹Nr.›</a:t>
+              <a:t>‹#›</a:t>
             </a:fld>
             <a:endParaRPr lang="de-CH"/>
           </a:p>
@@ -2329,7 +2330,7 @@
           <a:p>
             <a:fld id="{BD6BDAE4-A718-497F-BD43-B43AF474C268}" type="slidenum">
               <a:rPr lang="de-CH" smtClean="0"/>
-              <a:t>‹Nr.›</a:t>
+              <a:t>‹#›</a:t>
             </a:fld>
             <a:endParaRPr lang="de-CH"/>
           </a:p>
@@ -2471,7 +2472,7 @@
           <a:p>
             <a:fld id="{BD6BDAE4-A718-497F-BD43-B43AF474C268}" type="slidenum">
               <a:rPr lang="de-CH" smtClean="0"/>
-              <a:t>‹Nr.›</a:t>
+              <a:t>‹#›</a:t>
             </a:fld>
             <a:endParaRPr lang="de-CH"/>
           </a:p>
@@ -2584,7 +2585,7 @@
           <a:p>
             <a:fld id="{BD6BDAE4-A718-497F-BD43-B43AF474C268}" type="slidenum">
               <a:rPr lang="de-CH" smtClean="0"/>
-              <a:t>‹Nr.›</a:t>
+              <a:t>‹#›</a:t>
             </a:fld>
             <a:endParaRPr lang="de-CH"/>
           </a:p>
@@ -2897,7 +2898,7 @@
           <a:p>
             <a:fld id="{BD6BDAE4-A718-497F-BD43-B43AF474C268}" type="slidenum">
               <a:rPr lang="de-CH" smtClean="0"/>
-              <a:t>‹Nr.›</a:t>
+              <a:t>‹#›</a:t>
             </a:fld>
             <a:endParaRPr lang="de-CH"/>
           </a:p>
@@ -3186,7 +3187,7 @@
           <a:p>
             <a:fld id="{BD6BDAE4-A718-497F-BD43-B43AF474C268}" type="slidenum">
               <a:rPr lang="de-CH" smtClean="0"/>
-              <a:t>‹Nr.›</a:t>
+              <a:t>‹#›</a:t>
             </a:fld>
             <a:endParaRPr lang="de-CH"/>
           </a:p>
@@ -3465,7 +3466,7 @@
           <a:p>
             <a:fld id="{BD6BDAE4-A718-497F-BD43-B43AF474C268}" type="slidenum">
               <a:rPr lang="de-CH" smtClean="0"/>
-              <a:t>‹Nr.›</a:t>
+              <a:t>‹#›</a:t>
             </a:fld>
             <a:endParaRPr lang="de-CH"/>
           </a:p>
@@ -3942,6 +3943,139 @@
 </p:sld>
 </file>
 
+<file path=ppt/slides/slide10.xml><?xml version="1.0" encoding="utf-8"?>
+<p:sld xmlns:a="http://schemas.openxmlformats.org/drawingml/2006/main" xmlns:r="http://schemas.openxmlformats.org/officeDocument/2006/relationships" xmlns:p="http://schemas.openxmlformats.org/presentationml/2006/main">
+  <p:cSld>
+    <p:spTree>
+      <p:nvGrpSpPr>
+        <p:cNvPr id="1" name=""/>
+        <p:cNvGrpSpPr/>
+        <p:nvPr/>
+      </p:nvGrpSpPr>
+      <p:grpSpPr>
+        <a:xfrm>
+          <a:off x="0" y="0"/>
+          <a:ext cx="0" cy="0"/>
+          <a:chOff x="0" y="0"/>
+          <a:chExt cx="0" cy="0"/>
+        </a:xfrm>
+      </p:grpSpPr>
+      <p:sp>
+        <p:nvSpPr>
+          <p:cNvPr id="2" name="Title 1">
+            <a:extLst>
+              <a:ext uri="{FF2B5EF4-FFF2-40B4-BE49-F238E27FC236}">
+                <a16:creationId xmlns:a16="http://schemas.microsoft.com/office/drawing/2014/main" id="{9F816C77-C3F7-6666-79EA-7AD490CF58DD}"/>
+              </a:ext>
+            </a:extLst>
+          </p:cNvPr>
+          <p:cNvSpPr>
+            <a:spLocks noGrp="1"/>
+          </p:cNvSpPr>
+          <p:nvPr>
+            <p:ph type="title"/>
+          </p:nvPr>
+        </p:nvSpPr>
+        <p:spPr>
+          <a:xfrm>
+            <a:off x="838200" y="983690"/>
+            <a:ext cx="10515600" cy="1325563"/>
+          </a:xfrm>
+        </p:spPr>
+        <p:txBody>
+          <a:bodyPr>
+            <a:normAutofit fontScale="90000"/>
+          </a:bodyPr>
+          <a:lstStyle/>
+          <a:p>
+            <a:pPr algn="ctr"/>
+            <a:r>
+              <a:rPr lang="en-US" dirty="0" err="1"/>
+              <a:t>Vielen</a:t>
+            </a:r>
+            <a:r>
+              <a:rPr lang="en-US" dirty="0"/>
+              <a:t> Dank </a:t>
+            </a:r>
+            <a:r>
+              <a:rPr lang="en-US" dirty="0" err="1"/>
+              <a:t>fürs</a:t>
+            </a:r>
+            <a:r>
+              <a:rPr lang="en-US" dirty="0"/>
+              <a:t> </a:t>
+            </a:r>
+            <a:r>
+              <a:rPr lang="en-US" dirty="0" err="1"/>
+              <a:t>Zuhören</a:t>
+            </a:r>
+            <a:br>
+              <a:rPr lang="en-US" dirty="0"/>
+            </a:br>
+            <a:br>
+              <a:rPr lang="en-US" dirty="0"/>
+            </a:br>
+            <a:r>
+              <a:rPr lang="en-US" dirty="0" err="1"/>
+              <a:t>Fragen</a:t>
+            </a:r>
+            <a:r>
+              <a:rPr lang="en-US" dirty="0"/>
+              <a:t>?</a:t>
+            </a:r>
+            <a:endParaRPr lang="en-CH" dirty="0"/>
+          </a:p>
+        </p:txBody>
+      </p:sp>
+      <p:pic>
+        <p:nvPicPr>
+          <p:cNvPr id="4" name="Picture 3" descr="A goat with a goat's mouth wide open&#10;&#10;AI-generated content may be incorrect.">
+            <a:extLst>
+              <a:ext uri="{FF2B5EF4-FFF2-40B4-BE49-F238E27FC236}">
+                <a16:creationId xmlns:a16="http://schemas.microsoft.com/office/drawing/2014/main" id="{79F82487-2AB2-CB16-AD18-5A51009F2424}"/>
+              </a:ext>
+            </a:extLst>
+          </p:cNvPr>
+          <p:cNvPicPr>
+            <a:picLocks noChangeAspect="1"/>
+          </p:cNvPicPr>
+          <p:nvPr/>
+        </p:nvPicPr>
+        <p:blipFill>
+          <a:blip r:embed="rId2">
+            <a:extLst>
+              <a:ext uri="{28A0092B-C50C-407E-A947-70E740481C1C}">
+                <a14:useLocalDpi xmlns:a14="http://schemas.microsoft.com/office/drawing/2010/main" val="0"/>
+              </a:ext>
+            </a:extLst>
+          </a:blip>
+          <a:stretch>
+            <a:fillRect/>
+          </a:stretch>
+        </p:blipFill>
+        <p:spPr>
+          <a:xfrm>
+            <a:off x="4157382" y="2610130"/>
+            <a:ext cx="3877235" cy="3877235"/>
+          </a:xfrm>
+          <a:prstGeom prst="rect">
+            <a:avLst/>
+          </a:prstGeom>
+        </p:spPr>
+      </p:pic>
+    </p:spTree>
+    <p:extLst>
+      <p:ext uri="{BB962C8B-B14F-4D97-AF65-F5344CB8AC3E}">
+        <p14:creationId xmlns:p14="http://schemas.microsoft.com/office/powerpoint/2010/main" val="1620537775"/>
+      </p:ext>
+    </p:extLst>
+  </p:cSld>
+  <p:clrMapOvr>
+    <a:masterClrMapping/>
+  </p:clrMapOvr>
+</p:sld>
+</file>
+
 <file path=ppt/slides/slide2.xml><?xml version="1.0" encoding="utf-8"?>
 <p:sld xmlns:a="http://schemas.openxmlformats.org/drawingml/2006/main" xmlns:r="http://schemas.openxmlformats.org/officeDocument/2006/relationships" xmlns:p="http://schemas.openxmlformats.org/presentationml/2006/main">
   <p:cSld>
@@ -4070,15 +4204,15 @@
       </p:sp>
       <p:pic>
         <p:nvPicPr>
-          <p:cNvPr id="2050" name="Picture 2" descr="DAMN. – Kendrick Lamar – album review | LUDDITE STEREO">
-            <a:extLst>
-              <a:ext uri="{FF2B5EF4-FFF2-40B4-BE49-F238E27FC236}">
-                <a16:creationId xmlns:a16="http://schemas.microsoft.com/office/drawing/2014/main" id="{A00ABBA3-B820-5104-07FB-ABC291FC2B40}"/>
+          <p:cNvPr id="5" name="Content Placeholder 4" descr="A goat standing on gravel&#10;&#10;AI-generated content may be incorrect.">
+            <a:extLst>
+              <a:ext uri="{FF2B5EF4-FFF2-40B4-BE49-F238E27FC236}">
+                <a16:creationId xmlns:a16="http://schemas.microsoft.com/office/drawing/2014/main" id="{A84E7106-1DFE-7858-DE2A-206D3B324BDC}"/>
               </a:ext>
             </a:extLst>
           </p:cNvPr>
           <p:cNvPicPr>
-            <a:picLocks noGrp="1" noChangeAspect="1" noChangeArrowheads="1"/>
+            <a:picLocks noGrp="1" noChangeAspect="1"/>
           </p:cNvPicPr>
           <p:nvPr>
             <p:ph idx="1"/>
@@ -4092,29 +4226,15 @@
               </a:ext>
             </a:extLst>
           </a:blip>
-          <a:srcRect/>
           <a:stretch>
             <a:fillRect/>
           </a:stretch>
         </p:blipFill>
-        <p:spPr bwMode="auto">
+        <p:spPr>
           <a:xfrm>
-            <a:off x="4178703" y="2830813"/>
-            <a:ext cx="3834592" cy="2298129"/>
+            <a:off x="4650067" y="2878123"/>
+            <a:ext cx="2891864" cy="2893169"/>
           </a:xfrm>
-          <a:prstGeom prst="rect">
-            <a:avLst/>
-          </a:prstGeom>
-          <a:noFill/>
-          <a:extLst>
-            <a:ext uri="{909E8E84-426E-40DD-AFC4-6F175D3DCCD1}">
-              <a14:hiddenFill xmlns:a14="http://schemas.microsoft.com/office/drawing/2010/main">
-                <a:solidFill>
-                  <a:srgbClr val="FFFFFF"/>
-                </a:solidFill>
-              </a14:hiddenFill>
-            </a:ext>
-          </a:extLst>
         </p:spPr>
       </p:pic>
     </p:spTree>
@@ -4199,7 +4319,12 @@
             <p:ph idx="1"/>
           </p:nvPr>
         </p:nvSpPr>
-        <p:spPr/>
+        <p:spPr>
+          <a:xfrm>
+            <a:off x="838200" y="1825625"/>
+            <a:ext cx="10515600" cy="765175"/>
+          </a:xfrm>
+        </p:spPr>
         <p:txBody>
           <a:bodyPr>
             <a:normAutofit/>
@@ -4210,21 +4335,6 @@
             <a:r>
               <a:rPr lang="de-CH" sz="3200" dirty="0"/>
               <a:t>Roboter und Ziegen wollen fliehen.</a:t>
-            </a:r>
-          </a:p>
-          <a:p>
-            <a:pPr algn="ctr"/>
-            <a:r>
-              <a:rPr lang="de-CH" sz="3200" dirty="0"/>
-              <a:t>Der Security </a:t>
-            </a:r>
-            <a:r>
-              <a:rPr lang="de-CH" sz="3200" dirty="0" err="1"/>
-              <a:t>Guard</a:t>
-            </a:r>
-            <a:r>
-              <a:rPr lang="de-CH" sz="3200" dirty="0"/>
-              <a:t> will sie fangen</a:t>
             </a:r>
           </a:p>
         </p:txBody>
@@ -4258,7 +4368,7 @@
         </p:blipFill>
         <p:spPr bwMode="auto">
           <a:xfrm>
-            <a:off x="3240924" y="2955181"/>
+            <a:off x="3240923" y="3080687"/>
             <a:ext cx="5710151" cy="3221782"/>
           </a:xfrm>
           <a:prstGeom prst="rect">
@@ -4276,6 +4386,218 @@
           </a:extLst>
         </p:spPr>
       </p:pic>
+      <p:sp>
+        <p:nvSpPr>
+          <p:cNvPr id="4" name="Content Placeholder 2">
+            <a:extLst>
+              <a:ext uri="{FF2B5EF4-FFF2-40B4-BE49-F238E27FC236}">
+                <a16:creationId xmlns:a16="http://schemas.microsoft.com/office/drawing/2014/main" id="{F6278E99-E9A3-C57D-0558-950FAB8D2D11}"/>
+              </a:ext>
+            </a:extLst>
+          </p:cNvPr>
+          <p:cNvSpPr txBox="1">
+            <a:spLocks/>
+          </p:cNvSpPr>
+          <p:nvPr/>
+        </p:nvSpPr>
+        <p:spPr>
+          <a:xfrm>
+            <a:off x="838199" y="2417297"/>
+            <a:ext cx="10515600" cy="765175"/>
+          </a:xfrm>
+          <a:prstGeom prst="rect">
+            <a:avLst/>
+          </a:prstGeom>
+        </p:spPr>
+        <p:txBody>
+          <a:bodyPr vert="horz" lIns="91440" tIns="45720" rIns="91440" bIns="45720" rtlCol="0">
+            <a:normAutofit/>
+          </a:bodyPr>
+          <a:lstStyle>
+            <a:lvl1pPr marL="228600" indent="-228600" algn="l" defTabSz="914400" rtl="0" eaLnBrk="1" latinLnBrk="0" hangingPunct="1">
+              <a:lnSpc>
+                <a:spcPct val="90000"/>
+              </a:lnSpc>
+              <a:spcBef>
+                <a:spcPts val="1000"/>
+              </a:spcBef>
+              <a:buFont typeface="Arial" panose="020B0604020202020204" pitchFamily="34" charset="0"/>
+              <a:buChar char="•"/>
+              <a:defRPr sz="2800" kern="1200">
+                <a:solidFill>
+                  <a:schemeClr val="tx1"/>
+                </a:solidFill>
+                <a:latin typeface="+mn-lt"/>
+                <a:ea typeface="+mn-ea"/>
+                <a:cs typeface="+mn-cs"/>
+              </a:defRPr>
+            </a:lvl1pPr>
+            <a:lvl2pPr marL="685800" indent="-228600" algn="l" defTabSz="914400" rtl="0" eaLnBrk="1" latinLnBrk="0" hangingPunct="1">
+              <a:lnSpc>
+                <a:spcPct val="90000"/>
+              </a:lnSpc>
+              <a:spcBef>
+                <a:spcPts val="500"/>
+              </a:spcBef>
+              <a:buFont typeface="Arial" panose="020B0604020202020204" pitchFamily="34" charset="0"/>
+              <a:buChar char="•"/>
+              <a:defRPr sz="2400" kern="1200">
+                <a:solidFill>
+                  <a:schemeClr val="tx1"/>
+                </a:solidFill>
+                <a:latin typeface="+mn-lt"/>
+                <a:ea typeface="+mn-ea"/>
+                <a:cs typeface="+mn-cs"/>
+              </a:defRPr>
+            </a:lvl2pPr>
+            <a:lvl3pPr marL="1143000" indent="-228600" algn="l" defTabSz="914400" rtl="0" eaLnBrk="1" latinLnBrk="0" hangingPunct="1">
+              <a:lnSpc>
+                <a:spcPct val="90000"/>
+              </a:lnSpc>
+              <a:spcBef>
+                <a:spcPts val="500"/>
+              </a:spcBef>
+              <a:buFont typeface="Arial" panose="020B0604020202020204" pitchFamily="34" charset="0"/>
+              <a:buChar char="•"/>
+              <a:defRPr sz="2000" kern="1200">
+                <a:solidFill>
+                  <a:schemeClr val="tx1"/>
+                </a:solidFill>
+                <a:latin typeface="+mn-lt"/>
+                <a:ea typeface="+mn-ea"/>
+                <a:cs typeface="+mn-cs"/>
+              </a:defRPr>
+            </a:lvl3pPr>
+            <a:lvl4pPr marL="1600200" indent="-228600" algn="l" defTabSz="914400" rtl="0" eaLnBrk="1" latinLnBrk="0" hangingPunct="1">
+              <a:lnSpc>
+                <a:spcPct val="90000"/>
+              </a:lnSpc>
+              <a:spcBef>
+                <a:spcPts val="500"/>
+              </a:spcBef>
+              <a:buFont typeface="Arial" panose="020B0604020202020204" pitchFamily="34" charset="0"/>
+              <a:buChar char="•"/>
+              <a:defRPr sz="1800" kern="1200">
+                <a:solidFill>
+                  <a:schemeClr val="tx1"/>
+                </a:solidFill>
+                <a:latin typeface="+mn-lt"/>
+                <a:ea typeface="+mn-ea"/>
+                <a:cs typeface="+mn-cs"/>
+              </a:defRPr>
+            </a:lvl4pPr>
+            <a:lvl5pPr marL="2057400" indent="-228600" algn="l" defTabSz="914400" rtl="0" eaLnBrk="1" latinLnBrk="0" hangingPunct="1">
+              <a:lnSpc>
+                <a:spcPct val="90000"/>
+              </a:lnSpc>
+              <a:spcBef>
+                <a:spcPts val="500"/>
+              </a:spcBef>
+              <a:buFont typeface="Arial" panose="020B0604020202020204" pitchFamily="34" charset="0"/>
+              <a:buChar char="•"/>
+              <a:defRPr sz="1800" kern="1200">
+                <a:solidFill>
+                  <a:schemeClr val="tx1"/>
+                </a:solidFill>
+                <a:latin typeface="+mn-lt"/>
+                <a:ea typeface="+mn-ea"/>
+                <a:cs typeface="+mn-cs"/>
+              </a:defRPr>
+            </a:lvl5pPr>
+            <a:lvl6pPr marL="2514600" indent="-228600" algn="l" defTabSz="914400" rtl="0" eaLnBrk="1" latinLnBrk="0" hangingPunct="1">
+              <a:lnSpc>
+                <a:spcPct val="90000"/>
+              </a:lnSpc>
+              <a:spcBef>
+                <a:spcPts val="500"/>
+              </a:spcBef>
+              <a:buFont typeface="Arial" panose="020B0604020202020204" pitchFamily="34" charset="0"/>
+              <a:buChar char="•"/>
+              <a:defRPr sz="1800" kern="1200">
+                <a:solidFill>
+                  <a:schemeClr val="tx1"/>
+                </a:solidFill>
+                <a:latin typeface="+mn-lt"/>
+                <a:ea typeface="+mn-ea"/>
+                <a:cs typeface="+mn-cs"/>
+              </a:defRPr>
+            </a:lvl6pPr>
+            <a:lvl7pPr marL="2971800" indent="-228600" algn="l" defTabSz="914400" rtl="0" eaLnBrk="1" latinLnBrk="0" hangingPunct="1">
+              <a:lnSpc>
+                <a:spcPct val="90000"/>
+              </a:lnSpc>
+              <a:spcBef>
+                <a:spcPts val="500"/>
+              </a:spcBef>
+              <a:buFont typeface="Arial" panose="020B0604020202020204" pitchFamily="34" charset="0"/>
+              <a:buChar char="•"/>
+              <a:defRPr sz="1800" kern="1200">
+                <a:solidFill>
+                  <a:schemeClr val="tx1"/>
+                </a:solidFill>
+                <a:latin typeface="+mn-lt"/>
+                <a:ea typeface="+mn-ea"/>
+                <a:cs typeface="+mn-cs"/>
+              </a:defRPr>
+            </a:lvl7pPr>
+            <a:lvl8pPr marL="3429000" indent="-228600" algn="l" defTabSz="914400" rtl="0" eaLnBrk="1" latinLnBrk="0" hangingPunct="1">
+              <a:lnSpc>
+                <a:spcPct val="90000"/>
+              </a:lnSpc>
+              <a:spcBef>
+                <a:spcPts val="500"/>
+              </a:spcBef>
+              <a:buFont typeface="Arial" panose="020B0604020202020204" pitchFamily="34" charset="0"/>
+              <a:buChar char="•"/>
+              <a:defRPr sz="1800" kern="1200">
+                <a:solidFill>
+                  <a:schemeClr val="tx1"/>
+                </a:solidFill>
+                <a:latin typeface="+mn-lt"/>
+                <a:ea typeface="+mn-ea"/>
+                <a:cs typeface="+mn-cs"/>
+              </a:defRPr>
+            </a:lvl8pPr>
+            <a:lvl9pPr marL="3886200" indent="-228600" algn="l" defTabSz="914400" rtl="0" eaLnBrk="1" latinLnBrk="0" hangingPunct="1">
+              <a:lnSpc>
+                <a:spcPct val="90000"/>
+              </a:lnSpc>
+              <a:spcBef>
+                <a:spcPts val="500"/>
+              </a:spcBef>
+              <a:buFont typeface="Arial" panose="020B0604020202020204" pitchFamily="34" charset="0"/>
+              <a:buChar char="•"/>
+              <a:defRPr sz="1800" kern="1200">
+                <a:solidFill>
+                  <a:schemeClr val="tx1"/>
+                </a:solidFill>
+                <a:latin typeface="+mn-lt"/>
+                <a:ea typeface="+mn-ea"/>
+                <a:cs typeface="+mn-cs"/>
+              </a:defRPr>
+            </a:lvl9pPr>
+          </a:lstStyle>
+          <a:p>
+            <a:pPr algn="ctr"/>
+            <a:r>
+              <a:rPr lang="de-DE" sz="3200" dirty="0"/>
+              <a:t>Der Security </a:t>
+            </a:r>
+            <a:r>
+              <a:rPr lang="de-DE" sz="3200" dirty="0" err="1"/>
+              <a:t>Guard</a:t>
+            </a:r>
+            <a:r>
+              <a:rPr lang="de-DE" sz="3200" dirty="0"/>
+              <a:t> will sie fangen</a:t>
+            </a:r>
+          </a:p>
+          <a:p>
+            <a:pPr algn="ctr"/>
+            <a:endParaRPr lang="de-CH" sz="3200" dirty="0"/>
+          </a:p>
+        </p:txBody>
+      </p:sp>
     </p:spTree>
     <p:extLst>
       <p:ext uri="{BB962C8B-B14F-4D97-AF65-F5344CB8AC3E}">
@@ -4286,6 +4608,161 @@
   <p:clrMapOvr>
     <a:masterClrMapping/>
   </p:clrMapOvr>
+  <p:timing>
+    <p:tnLst>
+      <p:par>
+        <p:cTn id="1" dur="indefinite" restart="never" nodeType="tmRoot">
+          <p:childTnLst>
+            <p:seq concurrent="1" nextAc="seek">
+              <p:cTn id="2" dur="indefinite" nodeType="mainSeq">
+                <p:childTnLst>
+                  <p:par>
+                    <p:cTn id="3" fill="hold">
+                      <p:stCondLst>
+                        <p:cond delay="indefinite"/>
+                      </p:stCondLst>
+                      <p:childTnLst>
+                        <p:par>
+                          <p:cTn id="4" fill="hold">
+                            <p:stCondLst>
+                              <p:cond delay="0"/>
+                            </p:stCondLst>
+                            <p:childTnLst>
+                              <p:par>
+                                <p:cTn id="5" presetID="1" presetClass="entr" presetSubtype="0" fill="hold" grpId="0" nodeType="clickEffect">
+                                  <p:stCondLst>
+                                    <p:cond delay="0"/>
+                                  </p:stCondLst>
+                                  <p:childTnLst>
+                                    <p:set>
+                                      <p:cBhvr>
+                                        <p:cTn id="6" dur="1" fill="hold">
+                                          <p:stCondLst>
+                                            <p:cond delay="0"/>
+                                          </p:stCondLst>
+                                        </p:cTn>
+                                        <p:tgtEl>
+                                          <p:spTgt spid="3">
+                                            <p:txEl>
+                                              <p:pRg st="0" end="0"/>
+                                            </p:txEl>
+                                          </p:spTgt>
+                                        </p:tgtEl>
+                                        <p:attrNameLst>
+                                          <p:attrName>style.visibility</p:attrName>
+                                        </p:attrNameLst>
+                                      </p:cBhvr>
+                                      <p:to>
+                                        <p:strVal val="visible"/>
+                                      </p:to>
+                                    </p:set>
+                                  </p:childTnLst>
+                                </p:cTn>
+                              </p:par>
+                            </p:childTnLst>
+                          </p:cTn>
+                        </p:par>
+                      </p:childTnLst>
+                    </p:cTn>
+                  </p:par>
+                  <p:par>
+                    <p:cTn id="7" fill="hold">
+                      <p:stCondLst>
+                        <p:cond delay="indefinite"/>
+                      </p:stCondLst>
+                      <p:childTnLst>
+                        <p:par>
+                          <p:cTn id="8" fill="hold">
+                            <p:stCondLst>
+                              <p:cond delay="0"/>
+                            </p:stCondLst>
+                            <p:childTnLst>
+                              <p:par>
+                                <p:cTn id="9" presetID="1" presetClass="entr" presetSubtype="0" fill="hold" grpId="0" nodeType="clickEffect">
+                                  <p:stCondLst>
+                                    <p:cond delay="0"/>
+                                  </p:stCondLst>
+                                  <p:childTnLst>
+                                    <p:set>
+                                      <p:cBhvr>
+                                        <p:cTn id="10" dur="1" fill="hold">
+                                          <p:stCondLst>
+                                            <p:cond delay="0"/>
+                                          </p:stCondLst>
+                                        </p:cTn>
+                                        <p:tgtEl>
+                                          <p:spTgt spid="4"/>
+                                        </p:tgtEl>
+                                        <p:attrNameLst>
+                                          <p:attrName>style.visibility</p:attrName>
+                                        </p:attrNameLst>
+                                      </p:cBhvr>
+                                      <p:to>
+                                        <p:strVal val="visible"/>
+                                      </p:to>
+                                    </p:set>
+                                  </p:childTnLst>
+                                </p:cTn>
+                              </p:par>
+                              <p:par>
+                                <p:cTn id="11" presetID="1" presetClass="entr" presetSubtype="0" fill="hold" nodeType="withEffect">
+                                  <p:stCondLst>
+                                    <p:cond delay="0"/>
+                                  </p:stCondLst>
+                                  <p:childTnLst>
+                                    <p:set>
+                                      <p:cBhvr>
+                                        <p:cTn id="12" dur="1" fill="hold">
+                                          <p:stCondLst>
+                                            <p:cond delay="0"/>
+                                          </p:stCondLst>
+                                        </p:cTn>
+                                        <p:tgtEl>
+                                          <p:spTgt spid="3074"/>
+                                        </p:tgtEl>
+                                        <p:attrNameLst>
+                                          <p:attrName>style.visibility</p:attrName>
+                                        </p:attrNameLst>
+                                      </p:cBhvr>
+                                      <p:to>
+                                        <p:strVal val="visible"/>
+                                      </p:to>
+                                    </p:set>
+                                  </p:childTnLst>
+                                </p:cTn>
+                              </p:par>
+                            </p:childTnLst>
+                          </p:cTn>
+                        </p:par>
+                      </p:childTnLst>
+                    </p:cTn>
+                  </p:par>
+                </p:childTnLst>
+              </p:cTn>
+              <p:prevCondLst>
+                <p:cond evt="onPrev" delay="0">
+                  <p:tgtEl>
+                    <p:sldTgt/>
+                  </p:tgtEl>
+                </p:cond>
+              </p:prevCondLst>
+              <p:nextCondLst>
+                <p:cond evt="onNext" delay="0">
+                  <p:tgtEl>
+                    <p:sldTgt/>
+                  </p:tgtEl>
+                </p:cond>
+              </p:nextCondLst>
+            </p:seq>
+          </p:childTnLst>
+        </p:cTn>
+      </p:par>
+    </p:tnLst>
+    <p:bldLst>
+      <p:bldP spid="3" grpId="0" build="p"/>
+      <p:bldP spid="4" grpId="0"/>
+    </p:bldLst>
+  </p:timing>
 </p:sld>
 </file>
 
@@ -4437,8 +4914,170 @@
             <a:pPr algn="ctr"/>
             <a:r>
               <a:rPr lang="de-CH" dirty="0"/>
-              <a:t>Mechanik</a:t>
-            </a:r>
+              <a:t>Spielmechanik</a:t>
+            </a:r>
+          </a:p>
+        </p:txBody>
+      </p:sp>
+      <p:pic>
+        <p:nvPicPr>
+          <p:cNvPr id="4" name="Picture 3" descr="A yellow and blue circle&#10;&#10;AI-generated content may be incorrect.">
+            <a:extLst>
+              <a:ext uri="{FF2B5EF4-FFF2-40B4-BE49-F238E27FC236}">
+                <a16:creationId xmlns:a16="http://schemas.microsoft.com/office/drawing/2014/main" id="{48729E32-B86E-06B2-56D5-89C95FC1C460}"/>
+              </a:ext>
+            </a:extLst>
+          </p:cNvPr>
+          <p:cNvPicPr>
+            <a:picLocks noChangeAspect="1"/>
+          </p:cNvPicPr>
+          <p:nvPr/>
+        </p:nvPicPr>
+        <p:blipFill>
+          <a:blip r:embed="rId2">
+            <a:extLst>
+              <a:ext uri="{28A0092B-C50C-407E-A947-70E740481C1C}">
+                <a14:useLocalDpi xmlns:a14="http://schemas.microsoft.com/office/drawing/2010/main" val="0"/>
+              </a:ext>
+            </a:extLst>
+          </a:blip>
+          <a:stretch>
+            <a:fillRect/>
+          </a:stretch>
+        </p:blipFill>
+        <p:spPr>
+          <a:xfrm>
+            <a:off x="6618514" y="1681553"/>
+            <a:ext cx="3598385" cy="3494891"/>
+          </a:xfrm>
+          <a:prstGeom prst="rect">
+            <a:avLst/>
+          </a:prstGeom>
+        </p:spPr>
+      </p:pic>
+      <p:pic>
+        <p:nvPicPr>
+          <p:cNvPr id="6" name="Picture 5" descr="A blue and yellow circle with a black background&#10;&#10;AI-generated content may be incorrect.">
+            <a:extLst>
+              <a:ext uri="{FF2B5EF4-FFF2-40B4-BE49-F238E27FC236}">
+                <a16:creationId xmlns:a16="http://schemas.microsoft.com/office/drawing/2014/main" id="{504216DD-0197-3C02-B1E3-5D8551BA5FAF}"/>
+              </a:ext>
+            </a:extLst>
+          </p:cNvPr>
+          <p:cNvPicPr>
+            <a:picLocks noChangeAspect="1"/>
+          </p:cNvPicPr>
+          <p:nvPr/>
+        </p:nvPicPr>
+        <p:blipFill>
+          <a:blip r:embed="rId3">
+            <a:extLst>
+              <a:ext uri="{28A0092B-C50C-407E-A947-70E740481C1C}">
+                <a14:useLocalDpi xmlns:a14="http://schemas.microsoft.com/office/drawing/2010/main" val="0"/>
+              </a:ext>
+            </a:extLst>
+          </a:blip>
+          <a:stretch>
+            <a:fillRect/>
+          </a:stretch>
+        </p:blipFill>
+        <p:spPr>
+          <a:xfrm>
+            <a:off x="2097021" y="2145789"/>
+            <a:ext cx="2740158" cy="2566421"/>
+          </a:xfrm>
+          <a:prstGeom prst="rect">
+            <a:avLst/>
+          </a:prstGeom>
+        </p:spPr>
+      </p:pic>
+      <p:sp>
+        <p:nvSpPr>
+          <p:cNvPr id="7" name="TextBox 6">
+            <a:extLst>
+              <a:ext uri="{FF2B5EF4-FFF2-40B4-BE49-F238E27FC236}">
+                <a16:creationId xmlns:a16="http://schemas.microsoft.com/office/drawing/2014/main" id="{A9E8E2D7-5D2D-FD8B-3164-550D292A6757}"/>
+              </a:ext>
+            </a:extLst>
+          </p:cNvPr>
+          <p:cNvSpPr txBox="1"/>
+          <p:nvPr/>
+        </p:nvSpPr>
+        <p:spPr>
+          <a:xfrm>
+            <a:off x="2214253" y="5283687"/>
+            <a:ext cx="2505694" cy="523220"/>
+          </a:xfrm>
+          <a:prstGeom prst="rect">
+            <a:avLst/>
+          </a:prstGeom>
+          <a:noFill/>
+        </p:spPr>
+        <p:txBody>
+          <a:bodyPr wrap="square" rtlCol="0">
+            <a:spAutoFit/>
+          </a:bodyPr>
+          <a:lstStyle/>
+          <a:p>
+            <a:pPr algn="ctr"/>
+            <a:r>
+              <a:rPr lang="en-US" sz="2800" dirty="0">
+                <a:latin typeface="+mj-lt"/>
+                <a:ea typeface="+mj-ea"/>
+                <a:cs typeface="+mj-cs"/>
+              </a:rPr>
+              <a:t>Security Guard</a:t>
+            </a:r>
+            <a:endParaRPr lang="en-CH" sz="2800" dirty="0">
+              <a:latin typeface="+mj-lt"/>
+              <a:ea typeface="+mj-ea"/>
+              <a:cs typeface="+mj-cs"/>
+            </a:endParaRPr>
+          </a:p>
+        </p:txBody>
+      </p:sp>
+      <p:sp>
+        <p:nvSpPr>
+          <p:cNvPr id="8" name="TextBox 7">
+            <a:extLst>
+              <a:ext uri="{FF2B5EF4-FFF2-40B4-BE49-F238E27FC236}">
+                <a16:creationId xmlns:a16="http://schemas.microsoft.com/office/drawing/2014/main" id="{7C93485A-16EB-770E-C1A9-9982823B7158}"/>
+              </a:ext>
+            </a:extLst>
+          </p:cNvPr>
+          <p:cNvSpPr txBox="1"/>
+          <p:nvPr/>
+        </p:nvSpPr>
+        <p:spPr>
+          <a:xfrm>
+            <a:off x="7246422" y="5283687"/>
+            <a:ext cx="2505694" cy="523220"/>
+          </a:xfrm>
+          <a:prstGeom prst="rect">
+            <a:avLst/>
+          </a:prstGeom>
+          <a:noFill/>
+        </p:spPr>
+        <p:txBody>
+          <a:bodyPr wrap="square" rtlCol="0">
+            <a:spAutoFit/>
+          </a:bodyPr>
+          <a:lstStyle/>
+          <a:p>
+            <a:pPr algn="ctr"/>
+            <a:r>
+              <a:rPr lang="en-US" sz="2800" dirty="0" err="1">
+                <a:latin typeface="+mj-lt"/>
+                <a:ea typeface="+mj-ea"/>
+                <a:cs typeface="+mj-cs"/>
+              </a:rPr>
+              <a:t>Ziegen</a:t>
+            </a:r>
+            <a:endParaRPr lang="en-CH" sz="2800" dirty="0">
+              <a:latin typeface="+mj-lt"/>
+              <a:ea typeface="+mj-ea"/>
+              <a:cs typeface="+mj-cs"/>
+            </a:endParaRPr>
           </a:p>
         </p:txBody>
       </p:sp>
@@ -4854,53 +5493,6 @@
           </a:p>
         </p:txBody>
       </p:sp>
-      <p:pic>
-        <p:nvPicPr>
-          <p:cNvPr id="5124" name="Picture 4" descr="Pepe Silvia | Know Your Meme">
-            <a:extLst>
-              <a:ext uri="{FF2B5EF4-FFF2-40B4-BE49-F238E27FC236}">
-                <a16:creationId xmlns:a16="http://schemas.microsoft.com/office/drawing/2014/main" id="{141AC9F5-6E68-AA0F-0F87-ECD026A4398E}"/>
-              </a:ext>
-            </a:extLst>
-          </p:cNvPr>
-          <p:cNvPicPr>
-            <a:picLocks noChangeAspect="1" noChangeArrowheads="1"/>
-          </p:cNvPicPr>
-          <p:nvPr/>
-        </p:nvPicPr>
-        <p:blipFill>
-          <a:blip r:embed="rId2">
-            <a:extLst>
-              <a:ext uri="{28A0092B-C50C-407E-A947-70E740481C1C}">
-                <a14:useLocalDpi xmlns:a14="http://schemas.microsoft.com/office/drawing/2010/main" val="0"/>
-              </a:ext>
-            </a:extLst>
-          </a:blip>
-          <a:srcRect/>
-          <a:stretch>
-            <a:fillRect/>
-          </a:stretch>
-        </p:blipFill>
-        <p:spPr bwMode="auto">
-          <a:xfrm>
-            <a:off x="4422197" y="3801196"/>
-            <a:ext cx="3347605" cy="2510704"/>
-          </a:xfrm>
-          <a:prstGeom prst="rect">
-            <a:avLst/>
-          </a:prstGeom>
-          <a:noFill/>
-          <a:extLst>
-            <a:ext uri="{909E8E84-426E-40DD-AFC4-6F175D3DCCD1}">
-              <a14:hiddenFill xmlns:a14="http://schemas.microsoft.com/office/drawing/2010/main">
-                <a:solidFill>
-                  <a:srgbClr val="FFFFFF"/>
-                </a:solidFill>
-              </a14:hiddenFill>
-            </a:ext>
-          </a:extLst>
-        </p:spPr>
-      </p:pic>
     </p:spTree>
     <p:extLst>
       <p:ext uri="{BB962C8B-B14F-4D97-AF65-F5344CB8AC3E}">

</xml_diff>

<commit_message>
updated Powerpoint and added timeline Graph
</commit_message>
<xml_diff>
--- a/Presentation/Gruppe10(Präsentation1).pptx
+++ b/Presentation/Gruppe10(Präsentation1).pptx
@@ -5552,44 +5552,21 @@
           </a:p>
         </p:txBody>
       </p:sp>
-      <p:sp>
-        <p:nvSpPr>
-          <p:cNvPr id="3" name="Content Placeholder 2">
-            <a:extLst>
-              <a:ext uri="{FF2B5EF4-FFF2-40B4-BE49-F238E27FC236}">
-                <a16:creationId xmlns:a16="http://schemas.microsoft.com/office/drawing/2014/main" id="{10637BB7-070E-2394-E546-8FBC515CEF6C}"/>
-              </a:ext>
-            </a:extLst>
-          </p:cNvPr>
-          <p:cNvSpPr>
-            <a:spLocks noGrp="1"/>
-          </p:cNvSpPr>
-          <p:nvPr>
-            <p:ph idx="1"/>
-          </p:nvPr>
-        </p:nvSpPr>
-        <p:spPr/>
-        <p:txBody>
-          <a:bodyPr/>
-          <a:lstStyle/>
-          <a:p>
-            <a:endParaRPr lang="de-CH" dirty="0"/>
-          </a:p>
-        </p:txBody>
-      </p:sp>
       <p:pic>
         <p:nvPicPr>
-          <p:cNvPr id="6146" name="Picture 2" descr="Where Is The Willem Dafoe Looking Up Meme From?">
-            <a:extLst>
-              <a:ext uri="{FF2B5EF4-FFF2-40B4-BE49-F238E27FC236}">
-                <a16:creationId xmlns:a16="http://schemas.microsoft.com/office/drawing/2014/main" id="{8EDE2A16-FABC-4C4A-AFC0-A62EC060DF08}"/>
+          <p:cNvPr id="5" name="Content Placeholder 4" descr="A screenshot of a graph&#10;&#10;AI-generated content may be incorrect.">
+            <a:extLst>
+              <a:ext uri="{FF2B5EF4-FFF2-40B4-BE49-F238E27FC236}">
+                <a16:creationId xmlns:a16="http://schemas.microsoft.com/office/drawing/2014/main" id="{EBDDD60C-0C75-F04C-B4C5-D00064B7E9CC}"/>
               </a:ext>
             </a:extLst>
           </p:cNvPr>
           <p:cNvPicPr>
-            <a:picLocks noChangeAspect="1" noChangeArrowheads="1"/>
+            <a:picLocks noGrp="1" noChangeAspect="1"/>
           </p:cNvPicPr>
-          <p:nvPr/>
+          <p:nvPr>
+            <p:ph idx="1"/>
+          </p:nvPr>
         </p:nvPicPr>
         <p:blipFill>
           <a:blip r:embed="rId2">
@@ -5599,29 +5576,15 @@
               </a:ext>
             </a:extLst>
           </a:blip>
-          <a:srcRect/>
           <a:stretch>
             <a:fillRect/>
           </a:stretch>
         </p:blipFill>
-        <p:spPr bwMode="auto">
+        <p:spPr>
           <a:xfrm>
-            <a:off x="3516283" y="4001294"/>
-            <a:ext cx="5159433" cy="2579717"/>
+            <a:off x="1800665" y="1361995"/>
+            <a:ext cx="9184808" cy="4419920"/>
           </a:xfrm>
-          <a:prstGeom prst="rect">
-            <a:avLst/>
-          </a:prstGeom>
-          <a:noFill/>
-          <a:extLst>
-            <a:ext uri="{909E8E84-426E-40DD-AFC4-6F175D3DCCD1}">
-              <a14:hiddenFill xmlns:a14="http://schemas.microsoft.com/office/drawing/2010/main">
-                <a:solidFill>
-                  <a:srgbClr val="FFFFFF"/>
-                </a:solidFill>
-              </a14:hiddenFill>
-            </a:ext>
-          </a:extLst>
         </p:spPr>
       </p:pic>
     </p:spTree>

</xml_diff>